<commit_message>
Working round robbin and unit test before refactor to mas-batch-aml-check
</commit_message>
<xml_diff>
--- a/amlcheck-docs/AML Check API.pptx
+++ b/amlcheck-docs/AML Check API.pptx
@@ -4308,7 +4308,7 @@
           <a:p>
             <a:r>
               <a:rPr lang="en-US" sz="1600" dirty="0" smtClean="0"/>
-              <a:t>AML-ANYLOAD-COMMAND-REPLY</a:t>
+              <a:t>AML-ANY-LOAD-COMMAND-REPLY</a:t>
             </a:r>
             <a:endParaRPr lang="en-US" sz="1600" dirty="0"/>
           </a:p>
@@ -4771,11 +4771,11 @@
           <a:p>
             <a:r>
               <a:rPr lang="en-US" sz="1600" dirty="0" smtClean="0"/>
-              <a:t>(TODO FILE COMPONENT )AML- </a:t>
+              <a:t>AML- {</a:t>
             </a:r>
             <a:r>
               <a:rPr lang="en-US" sz="1600" dirty="0"/>
-              <a:t>{SOAP | REST</a:t>
+              <a:t>SOAP | REST</a:t>
             </a:r>
             <a:r>
               <a:rPr lang="en-US" sz="1600" dirty="0" smtClean="0"/>
@@ -4796,8 +4796,8 @@
           </a:p>
           <a:p>
             <a:r>
-              <a:rPr lang="en-US" sz="1600" dirty="0" smtClean="0"/>
-              <a:t>(TABLE ROW COMPONENT) AML-EXTERNAL-TRANS-CLIENT-REPORT</a:t>
+              <a:rPr lang="en-US" sz="1600" smtClean="0"/>
+              <a:t>AML-EXTERNAL-TRANS-CLIENT-REPORT</a:t>
             </a:r>
             <a:endParaRPr lang="en-US" sz="1600" dirty="0" smtClean="0"/>
           </a:p>
@@ -4910,11 +4910,7 @@
             </a:pPr>
             <a:r>
               <a:rPr lang="en-US" sz="2000" dirty="0" smtClean="0"/>
-              <a:t>1.) GET    : /</a:t>
-            </a:r>
-            <a:r>
-              <a:rPr lang="en-US" sz="2000" dirty="0" smtClean="0"/>
-              <a:t>mas/</a:t>
+              <a:t>1.) GET    : /mas/</a:t>
             </a:r>
             <a:r>
               <a:rPr lang="en-US" sz="2000" dirty="0" err="1" smtClean="0"/>
@@ -4928,7 +4924,6 @@
               <a:rPr lang="en-US" sz="2000" b="1" dirty="0" smtClean="0"/>
               <a:t>/external/command-template</a:t>
             </a:r>
-            <a:endParaRPr lang="en-US" sz="2000" b="1" dirty="0" smtClean="0"/>
           </a:p>
           <a:p>
             <a:pPr marL="457200" lvl="1" indent="0">
@@ -4936,11 +4931,7 @@
             </a:pPr>
             <a:r>
               <a:rPr lang="en-US" sz="2000" dirty="0" smtClean="0"/>
-              <a:t>2.) POST : /</a:t>
-            </a:r>
-            <a:r>
-              <a:rPr lang="en-US" sz="2000" dirty="0" smtClean="0"/>
-              <a:t>mas/</a:t>
+              <a:t>2.) POST : /mas/</a:t>
             </a:r>
             <a:r>
               <a:rPr lang="en-US" sz="2000" dirty="0" err="1" smtClean="0"/>
@@ -4954,7 +4945,6 @@
               <a:rPr lang="en-US" sz="2000" b="1" dirty="0" smtClean="0"/>
               <a:t>/external/command</a:t>
             </a:r>
-            <a:endParaRPr lang="en-US" sz="2000" b="1" dirty="0" smtClean="0"/>
           </a:p>
           <a:p>
             <a:pPr marL="457200" lvl="1" indent="0">
@@ -6071,11 +6061,6 @@
               </a:rPr>
               <a:t>Error handling</a:t>
             </a:r>
-            <a:endParaRPr lang="en-US" b="1" dirty="0" smtClean="0">
-              <a:solidFill>
-                <a:srgbClr val="00B050"/>
-              </a:solidFill>
-            </a:endParaRPr>
           </a:p>
           <a:p>
             <a:pPr lvl="1"/>
@@ -6557,11 +6542,7 @@
             <a:pPr lvl="1"/>
             <a:r>
               <a:rPr lang="en-US" dirty="0" smtClean="0"/>
-              <a:t>On premise</a:t>
-            </a:r>
-            <a:r>
-              <a:rPr lang="en-US" dirty="0" smtClean="0"/>
-              <a:t>	</a:t>
+              <a:t>On premise	</a:t>
             </a:r>
           </a:p>
         </p:txBody>
@@ -6987,7 +6968,6 @@
               <a:rPr lang="en-US" dirty="0" smtClean="0"/>
               <a:t>Request	</a:t>
             </a:r>
-            <a:endParaRPr lang="en-US" dirty="0" smtClean="0"/>
           </a:p>
           <a:p>
             <a:pPr lvl="1"/>
@@ -6995,7 +6975,6 @@
               <a:rPr lang="en-US" dirty="0" smtClean="0"/>
               <a:t>Soap</a:t>
             </a:r>
-            <a:endParaRPr lang="en-US" dirty="0" smtClean="0"/>
           </a:p>
         </p:txBody>
       </p:sp>
@@ -7208,7 +7187,6 @@
               <a:rPr lang="en-US" dirty="0" smtClean="0"/>
               <a:t>Insert</a:t>
             </a:r>
-            <a:endParaRPr lang="en-US" dirty="0" smtClean="0"/>
           </a:p>
           <a:p>
             <a:pPr lvl="1"/>

</xml_diff>